<commit_message>
update after first launch
</commit_message>
<xml_diff>
--- a/data/Logo.pptx
+++ b/data/Logo.pptx
@@ -6,6 +6,7 @@
   </p:sldMasterIdLst>
   <p:sldIdLst>
     <p:sldId id="256" r:id="rId2"/>
+    <p:sldId id="257" r:id="rId3"/>
   </p:sldIdLst>
   <p:sldSz cx="12192000" cy="6858000"/>
   <p:notesSz cx="6858000" cy="9144000"/>
@@ -104,6 +105,11 @@
       </a:defRPr>
     </a:lvl9pPr>
   </p:defaultTextStyle>
+  <p:extLst>
+    <p:ext uri="{EFAFB233-063F-42B5-8137-9DF3F51BA10A}">
+      <p15:sldGuideLst xmlns:p15="http://schemas.microsoft.com/office/powerpoint/2012/main"/>
+    </p:ext>
+  </p:extLst>
 </p:presentation>
 </file>
 
@@ -256,7 +262,7 @@
           <a:p>
             <a:fld id="{BD61F358-11DE-A54E-9E6A-EDFE785F74C9}" type="datetimeFigureOut">
               <a:rPr lang="en-AT" smtClean="0"/>
-              <a:t>16.08.24</a:t>
+              <a:t>17.08.24</a:t>
             </a:fld>
             <a:endParaRPr lang="en-AT"/>
           </a:p>
@@ -456,7 +462,7 @@
           <a:p>
             <a:fld id="{BD61F358-11DE-A54E-9E6A-EDFE785F74C9}" type="datetimeFigureOut">
               <a:rPr lang="en-AT" smtClean="0"/>
-              <a:t>16.08.24</a:t>
+              <a:t>17.08.24</a:t>
             </a:fld>
             <a:endParaRPr lang="en-AT"/>
           </a:p>
@@ -666,7 +672,7 @@
           <a:p>
             <a:fld id="{BD61F358-11DE-A54E-9E6A-EDFE785F74C9}" type="datetimeFigureOut">
               <a:rPr lang="en-AT" smtClean="0"/>
-              <a:t>16.08.24</a:t>
+              <a:t>17.08.24</a:t>
             </a:fld>
             <a:endParaRPr lang="en-AT"/>
           </a:p>
@@ -866,7 +872,7 @@
           <a:p>
             <a:fld id="{BD61F358-11DE-A54E-9E6A-EDFE785F74C9}" type="datetimeFigureOut">
               <a:rPr lang="en-AT" smtClean="0"/>
-              <a:t>16.08.24</a:t>
+              <a:t>17.08.24</a:t>
             </a:fld>
             <a:endParaRPr lang="en-AT"/>
           </a:p>
@@ -1142,7 +1148,7 @@
           <a:p>
             <a:fld id="{BD61F358-11DE-A54E-9E6A-EDFE785F74C9}" type="datetimeFigureOut">
               <a:rPr lang="en-AT" smtClean="0"/>
-              <a:t>16.08.24</a:t>
+              <a:t>17.08.24</a:t>
             </a:fld>
             <a:endParaRPr lang="en-AT"/>
           </a:p>
@@ -1410,7 +1416,7 @@
           <a:p>
             <a:fld id="{BD61F358-11DE-A54E-9E6A-EDFE785F74C9}" type="datetimeFigureOut">
               <a:rPr lang="en-AT" smtClean="0"/>
-              <a:t>16.08.24</a:t>
+              <a:t>17.08.24</a:t>
             </a:fld>
             <a:endParaRPr lang="en-AT"/>
           </a:p>
@@ -1825,7 +1831,7 @@
           <a:p>
             <a:fld id="{BD61F358-11DE-A54E-9E6A-EDFE785F74C9}" type="datetimeFigureOut">
               <a:rPr lang="en-AT" smtClean="0"/>
-              <a:t>16.08.24</a:t>
+              <a:t>17.08.24</a:t>
             </a:fld>
             <a:endParaRPr lang="en-AT"/>
           </a:p>
@@ -1967,7 +1973,7 @@
           <a:p>
             <a:fld id="{BD61F358-11DE-A54E-9E6A-EDFE785F74C9}" type="datetimeFigureOut">
               <a:rPr lang="en-AT" smtClean="0"/>
-              <a:t>16.08.24</a:t>
+              <a:t>17.08.24</a:t>
             </a:fld>
             <a:endParaRPr lang="en-AT"/>
           </a:p>
@@ -2080,7 +2086,7 @@
           <a:p>
             <a:fld id="{BD61F358-11DE-A54E-9E6A-EDFE785F74C9}" type="datetimeFigureOut">
               <a:rPr lang="en-AT" smtClean="0"/>
-              <a:t>16.08.24</a:t>
+              <a:t>17.08.24</a:t>
             </a:fld>
             <a:endParaRPr lang="en-AT"/>
           </a:p>
@@ -2393,7 +2399,7 @@
           <a:p>
             <a:fld id="{BD61F358-11DE-A54E-9E6A-EDFE785F74C9}" type="datetimeFigureOut">
               <a:rPr lang="en-AT" smtClean="0"/>
-              <a:t>16.08.24</a:t>
+              <a:t>17.08.24</a:t>
             </a:fld>
             <a:endParaRPr lang="en-AT"/>
           </a:p>
@@ -2682,7 +2688,7 @@
           <a:p>
             <a:fld id="{BD61F358-11DE-A54E-9E6A-EDFE785F74C9}" type="datetimeFigureOut">
               <a:rPr lang="en-AT" smtClean="0"/>
-              <a:t>16.08.24</a:t>
+              <a:t>17.08.24</a:t>
             </a:fld>
             <a:endParaRPr lang="en-AT"/>
           </a:p>
@@ -2925,7 +2931,7 @@
           <a:p>
             <a:fld id="{BD61F358-11DE-A54E-9E6A-EDFE785F74C9}" type="datetimeFigureOut">
               <a:rPr lang="en-AT" smtClean="0"/>
-              <a:t>16.08.24</a:t>
+              <a:t>17.08.24</a:t>
             </a:fld>
             <a:endParaRPr lang="en-AT"/>
           </a:p>
@@ -3326,6 +3332,130 @@
 </file>
 
 <file path=ppt/slides/slide1.xml><?xml version="1.0" encoding="utf-8"?>
+<p:sld xmlns:a="http://schemas.openxmlformats.org/drawingml/2006/main" xmlns:r="http://schemas.openxmlformats.org/officeDocument/2006/relationships" xmlns:p="http://schemas.openxmlformats.org/presentationml/2006/main" show="0">
+  <p:cSld>
+    <p:bg>
+      <p:bgPr>
+        <a:solidFill>
+          <a:srgbClr val="FFFAF5"/>
+        </a:solidFill>
+        <a:effectLst/>
+      </p:bgPr>
+    </p:bg>
+    <p:spTree>
+      <p:nvGrpSpPr>
+        <p:cNvPr id="1" name=""/>
+        <p:cNvGrpSpPr/>
+        <p:nvPr/>
+      </p:nvGrpSpPr>
+      <p:grpSpPr>
+        <a:xfrm>
+          <a:off x="0" y="0"/>
+          <a:ext cx="0" cy="0"/>
+          <a:chOff x="0" y="0"/>
+          <a:chExt cx="0" cy="0"/>
+        </a:xfrm>
+      </p:grpSpPr>
+      <p:pic>
+        <p:nvPicPr>
+          <p:cNvPr id="5" name="Picture 4">
+            <a:extLst>
+              <a:ext uri="{FF2B5EF4-FFF2-40B4-BE49-F238E27FC236}">
+                <a16:creationId xmlns:a16="http://schemas.microsoft.com/office/drawing/2014/main" id="{1BCA4705-52D9-A78C-9B96-22C180B0CFDE}"/>
+              </a:ext>
+            </a:extLst>
+          </p:cNvPr>
+          <p:cNvPicPr>
+            <a:picLocks noChangeAspect="1"/>
+          </p:cNvPicPr>
+          <p:nvPr/>
+        </p:nvPicPr>
+        <p:blipFill>
+          <a:blip r:embed="rId2"/>
+          <a:stretch>
+            <a:fillRect/>
+          </a:stretch>
+        </p:blipFill>
+        <p:spPr>
+          <a:xfrm>
+            <a:off x="-783255" y="487180"/>
+            <a:ext cx="5708968" cy="5883639"/>
+          </a:xfrm>
+          <a:prstGeom prst="rect">
+            <a:avLst/>
+          </a:prstGeom>
+        </p:spPr>
+      </p:pic>
+      <p:sp>
+        <p:nvSpPr>
+          <p:cNvPr id="6" name="TextBox 5">
+            <a:extLst>
+              <a:ext uri="{FF2B5EF4-FFF2-40B4-BE49-F238E27FC236}">
+                <a16:creationId xmlns:a16="http://schemas.microsoft.com/office/drawing/2014/main" id="{00CA58D3-2E7A-78D3-AE64-6920532AEEC3}"/>
+              </a:ext>
+            </a:extLst>
+          </p:cNvPr>
+          <p:cNvSpPr txBox="1"/>
+          <p:nvPr/>
+        </p:nvSpPr>
+        <p:spPr>
+          <a:xfrm>
+            <a:off x="2653260" y="2382559"/>
+            <a:ext cx="9666157" cy="2400657"/>
+          </a:xfrm>
+          <a:prstGeom prst="rect">
+            <a:avLst/>
+          </a:prstGeom>
+          <a:noFill/>
+        </p:spPr>
+        <p:txBody>
+          <a:bodyPr wrap="square" rtlCol="0">
+            <a:spAutoFit/>
+          </a:bodyPr>
+          <a:lstStyle/>
+          <a:p>
+            <a:pPr algn="r"/>
+            <a:r>
+              <a:rPr lang="en-AT" sz="9000" dirty="0">
+                <a:solidFill>
+                  <a:srgbClr val="9E5A63"/>
+                </a:solidFill>
+                <a:latin typeface="Futura Medium" panose="020B0602020204020303" pitchFamily="34" charset="-79"/>
+                <a:ea typeface="Cambria Math" panose="02040503050406030204" pitchFamily="18" charset="0"/>
+                <a:cs typeface="Futura Medium" panose="020B0602020204020303" pitchFamily="34" charset="-79"/>
+              </a:rPr>
+              <a:t>PETER ÖHLINGER</a:t>
+            </a:r>
+          </a:p>
+          <a:p>
+            <a:pPr algn="r"/>
+            <a:r>
+              <a:rPr lang="en-AT" sz="6000" dirty="0">
+                <a:solidFill>
+                  <a:srgbClr val="17181A"/>
+                </a:solidFill>
+                <a:latin typeface="Futura Medium" panose="020B0602020204020303" pitchFamily="34" charset="-79"/>
+                <a:cs typeface="Futura Medium" panose="020B0602020204020303" pitchFamily="34" charset="-79"/>
+              </a:rPr>
+              <a:t>PhD Candidate</a:t>
+            </a:r>
+          </a:p>
+        </p:txBody>
+      </p:sp>
+    </p:spTree>
+    <p:extLst>
+      <p:ext uri="{BB962C8B-B14F-4D97-AF65-F5344CB8AC3E}">
+        <p14:creationId xmlns:p14="http://schemas.microsoft.com/office/powerpoint/2010/main" val="2530018683"/>
+      </p:ext>
+    </p:extLst>
+  </p:cSld>
+  <p:clrMapOvr>
+    <a:masterClrMapping/>
+  </p:clrMapOvr>
+</p:sld>
+</file>
+
+<file path=ppt/slides/slide2.xml><?xml version="1.0" encoding="utf-8"?>
 <p:sld xmlns:a="http://schemas.openxmlformats.org/drawingml/2006/main" xmlns:r="http://schemas.openxmlformats.org/officeDocument/2006/relationships" xmlns:p="http://schemas.openxmlformats.org/presentationml/2006/main">
   <p:cSld>
     <p:bg>
@@ -3394,8 +3524,8 @@
         </p:nvSpPr>
         <p:spPr>
           <a:xfrm>
-            <a:off x="2653260" y="2382559"/>
-            <a:ext cx="9666157" cy="2400657"/>
+            <a:off x="2071229" y="2498173"/>
+            <a:ext cx="6322574" cy="2862322"/>
           </a:xfrm>
           <a:prstGeom prst="rect">
             <a:avLst/>
@@ -3418,35 +3548,29 @@
                 <a:ea typeface="Cambria Math" panose="02040503050406030204" pitchFamily="18" charset="0"/>
                 <a:cs typeface="Futura Medium" panose="020B0602020204020303" pitchFamily="34" charset="-79"/>
               </a:rPr>
-              <a:t>PETER ÖHLINGER</a:t>
+              <a:t>ÖHLINGER</a:t>
             </a:r>
           </a:p>
           <a:p>
             <a:pPr algn="r"/>
             <a:r>
-              <a:rPr lang="en-AT" sz="6000" dirty="0">
+              <a:rPr lang="en-AT" sz="9000" dirty="0">
                 <a:solidFill>
-                  <a:srgbClr val="17181A"/>
+                  <a:srgbClr val="9E5A63"/>
                 </a:solidFill>
                 <a:latin typeface="Futura Medium" panose="020B0602020204020303" pitchFamily="34" charset="-79"/>
+                <a:ea typeface="Cambria Math" panose="02040503050406030204" pitchFamily="18" charset="0"/>
                 <a:cs typeface="Futura Medium" panose="020B0602020204020303" pitchFamily="34" charset="-79"/>
               </a:rPr>
-              <a:t>PhD Candidate</a:t>
-            </a:r>
-            <a:endParaRPr lang="en-AT" sz="6000" dirty="0">
-              <a:solidFill>
-                <a:srgbClr val="17181A"/>
-              </a:solidFill>
-              <a:latin typeface="Futura Medium" panose="020B0602020204020303" pitchFamily="34" charset="-79"/>
-              <a:cs typeface="Futura Medium" panose="020B0602020204020303" pitchFamily="34" charset="-79"/>
-            </a:endParaRPr>
+              <a:t>PETER</a:t>
+            </a:r>
           </a:p>
         </p:txBody>
       </p:sp>
     </p:spTree>
     <p:extLst>
       <p:ext uri="{BB962C8B-B14F-4D97-AF65-F5344CB8AC3E}">
-        <p14:creationId xmlns:p14="http://schemas.microsoft.com/office/powerpoint/2010/main" val="2530018683"/>
+        <p14:creationId xmlns:p14="http://schemas.microsoft.com/office/powerpoint/2010/main" val="578673110"/>
       </p:ext>
     </p:extLst>
   </p:cSld>

</xml_diff>